<commit_message>
Update slides for tls 1.3
</commit_message>
<xml_diff>
--- a/hackathon-presentation-ietf103_tls13.pptx
+++ b/hackathon-presentation-ietf103_tls13.pptx
@@ -238,7 +238,7 @@
           <a:bodyPr lIns="0" rIns="0" tIns="0" bIns="0" anchor="b"/>
           <a:p>
             <a:pPr algn="r"/>
-            <a:fld id="{85AA5632-E05B-458E-AE40-1D7C0C8B40A6}" type="slidenum">
+            <a:fld id="{159EE8FA-404A-4990-B0BB-7D3C8888BAEB}" type="slidenum">
               <a:rPr b="0" lang="en-US" sz="1400" spc="-1" strike="noStrike">
                 <a:latin typeface="Times New Roman"/>
               </a:rPr>
@@ -348,7 +348,7 @@
                 <a:spcPct val="100000"/>
               </a:lnSpc>
             </a:pPr>
-            <a:fld id="{2222D317-4AAC-4688-A2C4-4A1D06827F89}" type="slidenum">
+            <a:fld id="{29371476-C0B6-4E50-A24D-82BFF65DA26C}" type="slidenum">
               <a:rPr b="0" lang="en-US" sz="1800" spc="-1" strike="noStrike">
                 <a:solidFill>
                   <a:srgbClr val="000000"/>
@@ -3478,17 +3478,7 @@
                 <a:latin typeface="Calibri"/>
                 <a:ea typeface="Calibri"/>
               </a:rPr>
-              <a:t>Body Level </a:t>
-            </a:r>
-            <a:r>
-              <a:rPr b="0" lang="en-US" sz="3200" spc="-1" strike="noStrike">
-                <a:solidFill>
-                  <a:srgbClr val="888888"/>
-                </a:solidFill>
-                <a:latin typeface="Calibri"/>
-                <a:ea typeface="Calibri"/>
-              </a:rPr>
-              <a:t>Five</a:t>
+              <a:t>Body Level Five</a:t>
             </a:r>
             <a:endParaRPr b="0" lang="en-US" sz="3200" spc="-1" strike="noStrike">
               <a:solidFill>
@@ -3526,7 +3516,7 @@
                 <a:spcPct val="100000"/>
               </a:lnSpc>
             </a:pPr>
-            <a:fld id="{7867887C-0B69-430B-9961-EB32B1003AE8}" type="slidenum">
+            <a:fld id="{50D7C8E1-6505-42CF-A5DD-A5E7EF88BCF7}" type="slidenum">
               <a:rPr b="0" lang="en-US" sz="1200" spc="-1" strike="noStrike">
                 <a:solidFill>
                   <a:srgbClr val="888888"/>
@@ -3886,7 +3876,7 @@
                 <a:spcPct val="100000"/>
               </a:lnSpc>
             </a:pPr>
-            <a:fld id="{B9EEFBB1-1D59-4101-81D1-F415CFF5231F}" type="slidenum">
+            <a:fld id="{56535BC9-229E-43ED-BA14-46388C45C1A6}" type="slidenum">
               <a:rPr b="0" lang="en-US" sz="1200" spc="-1" strike="noStrike">
                 <a:solidFill>
                   <a:srgbClr val="888888"/>
@@ -4516,7 +4506,7 @@
                 <a:spcPct val="100000"/>
               </a:lnSpc>
             </a:pPr>
-            <a:fld id="{E763F5B0-05B2-4199-84FF-6732519F21E4}" type="slidenum">
+            <a:fld id="{6E6F6742-5893-4E69-8B45-F48174DDC9D7}" type="slidenum">
               <a:rPr b="0" lang="en-US" sz="1200" spc="-1" strike="noStrike">
                 <a:solidFill>
                   <a:srgbClr val="888888"/>
@@ -4853,7 +4843,7 @@
                 <a:spcPct val="100000"/>
               </a:lnSpc>
             </a:pPr>
-            <a:fld id="{BA4847D6-28E7-482E-ADF7-5638618B5C5A}" type="slidenum">
+            <a:fld id="{19E2DF4F-253F-4479-AB56-D4B5CABF8623}" type="slidenum">
               <a:rPr b="0" lang="en-US" sz="1200" spc="-1" strike="noStrike">
                 <a:solidFill>
                   <a:srgbClr val="888888"/>
@@ -5138,7 +5128,7 @@
                 <a:spcPct val="100000"/>
               </a:lnSpc>
             </a:pPr>
-            <a:fld id="{DEEA445D-CB0E-422C-BAA9-DB71E9D9157A}" type="slidenum">
+            <a:fld id="{E8DE7671-EBE1-4A39-B893-0A0C942A2A35}" type="slidenum">
               <a:rPr b="0" lang="en-US" sz="1200" spc="-1" strike="noStrike">
                 <a:solidFill>
                   <a:srgbClr val="888888"/>
@@ -5238,7 +5228,147 @@
                 <a:latin typeface="Calibri"/>
                 <a:ea typeface="Calibri"/>
               </a:rPr>
-              <a:t>What we learned</a:t>
+              <a:t>W</a:t>
+            </a:r>
+            <a:r>
+              <a:rPr b="0" lang="en-US" sz="4400" spc="-1" strike="noStrike">
+                <a:solidFill>
+                  <a:srgbClr val="000000"/>
+                </a:solidFill>
+                <a:latin typeface="Calibri"/>
+                <a:ea typeface="Calibri"/>
+              </a:rPr>
+              <a:t>h</a:t>
+            </a:r>
+            <a:r>
+              <a:rPr b="0" lang="en-US" sz="4400" spc="-1" strike="noStrike">
+                <a:solidFill>
+                  <a:srgbClr val="000000"/>
+                </a:solidFill>
+                <a:latin typeface="Calibri"/>
+                <a:ea typeface="Calibri"/>
+              </a:rPr>
+              <a:t>a</a:t>
+            </a:r>
+            <a:r>
+              <a:rPr b="0" lang="en-US" sz="4400" spc="-1" strike="noStrike">
+                <a:solidFill>
+                  <a:srgbClr val="000000"/>
+                </a:solidFill>
+                <a:latin typeface="Calibri"/>
+                <a:ea typeface="Calibri"/>
+              </a:rPr>
+              <a:t>t</a:t>
+            </a:r>
+            <a:r>
+              <a:rPr b="0" lang="en-US" sz="4400" spc="-1" strike="noStrike">
+                <a:solidFill>
+                  <a:srgbClr val="000000"/>
+                </a:solidFill>
+                <a:latin typeface="Calibri"/>
+                <a:ea typeface="Calibri"/>
+              </a:rPr>
+              <a:t> </a:t>
+            </a:r>
+            <a:r>
+              <a:rPr b="0" lang="en-US" sz="4400" spc="-1" strike="noStrike">
+                <a:solidFill>
+                  <a:srgbClr val="000000"/>
+                </a:solidFill>
+                <a:latin typeface="Calibri"/>
+                <a:ea typeface="Calibri"/>
+              </a:rPr>
+              <a:t>w</a:t>
+            </a:r>
+            <a:r>
+              <a:rPr b="0" lang="en-US" sz="4400" spc="-1" strike="noStrike">
+                <a:solidFill>
+                  <a:srgbClr val="000000"/>
+                </a:solidFill>
+                <a:latin typeface="Calibri"/>
+                <a:ea typeface="Calibri"/>
+              </a:rPr>
+              <a:t>e</a:t>
+            </a:r>
+            <a:r>
+              <a:rPr b="0" lang="en-US" sz="4400" spc="-1" strike="noStrike">
+                <a:solidFill>
+                  <a:srgbClr val="000000"/>
+                </a:solidFill>
+                <a:latin typeface="Calibri"/>
+                <a:ea typeface="Calibri"/>
+              </a:rPr>
+              <a:t> </a:t>
+            </a:r>
+            <a:r>
+              <a:rPr b="0" lang="en-US" sz="4400" spc="-1" strike="noStrike">
+                <a:solidFill>
+                  <a:srgbClr val="000000"/>
+                </a:solidFill>
+                <a:latin typeface="Calibri"/>
+                <a:ea typeface="Calibri"/>
+              </a:rPr>
+              <a:t>l</a:t>
+            </a:r>
+            <a:r>
+              <a:rPr b="0" lang="en-US" sz="4400" spc="-1" strike="noStrike">
+                <a:solidFill>
+                  <a:srgbClr val="000000"/>
+                </a:solidFill>
+                <a:latin typeface="Calibri"/>
+                <a:ea typeface="Calibri"/>
+              </a:rPr>
+              <a:t>e</a:t>
+            </a:r>
+            <a:r>
+              <a:rPr b="0" lang="en-US" sz="4400" spc="-1" strike="noStrike">
+                <a:solidFill>
+                  <a:srgbClr val="000000"/>
+                </a:solidFill>
+                <a:latin typeface="Calibri"/>
+                <a:ea typeface="Calibri"/>
+              </a:rPr>
+              <a:t>a</a:t>
+            </a:r>
+            <a:r>
+              <a:rPr b="0" lang="en-US" sz="4400" spc="-1" strike="noStrike">
+                <a:solidFill>
+                  <a:srgbClr val="000000"/>
+                </a:solidFill>
+                <a:latin typeface="Calibri"/>
+                <a:ea typeface="Calibri"/>
+              </a:rPr>
+              <a:t>r</a:t>
+            </a:r>
+            <a:r>
+              <a:rPr b="0" lang="en-US" sz="4400" spc="-1" strike="noStrike">
+                <a:solidFill>
+                  <a:srgbClr val="000000"/>
+                </a:solidFill>
+                <a:latin typeface="Calibri"/>
+                <a:ea typeface="Calibri"/>
+              </a:rPr>
+              <a:t>n</a:t>
+            </a:r>
+            <a:r>
+              <a:rPr b="0" lang="en-US" sz="4400" spc="-1" strike="noStrike">
+                <a:solidFill>
+                  <a:srgbClr val="000000"/>
+                </a:solidFill>
+                <a:latin typeface="Calibri"/>
+                <a:ea typeface="Calibri"/>
+              </a:rPr>
+              <a:t>e</a:t>
+            </a:r>
+            <a:r>
+              <a:rPr b="0" lang="en-US" sz="4400" spc="-1" strike="noStrike">
+                <a:solidFill>
+                  <a:srgbClr val="000000"/>
+                </a:solidFill>
+                <a:latin typeface="Calibri"/>
+                <a:ea typeface="Calibri"/>
+              </a:rPr>
+              <a:t>d</a:t>
             </a:r>
             <a:endParaRPr b="0" lang="en-US" sz="4400" spc="-1" strike="noStrike">
               <a:solidFill>
@@ -5423,7 +5553,7 @@
                 <a:spcPct val="100000"/>
               </a:lnSpc>
             </a:pPr>
-            <a:fld id="{4FA91A55-2262-4B32-BE16-7B8ED485E72E}" type="slidenum">
+            <a:fld id="{F3F959BB-1F80-4F2B-88C5-183ED47C6032}" type="slidenum">
               <a:rPr b="0" lang="en-US" sz="1200" spc="-1" strike="noStrike">
                 <a:solidFill>
                   <a:srgbClr val="888888"/>
@@ -5817,7 +5947,7 @@
                 <a:spcPct val="100000"/>
               </a:lnSpc>
             </a:pPr>
-            <a:fld id="{6EE2C195-56E3-40BF-BCB0-C8F45CDC5E02}" type="slidenum">
+            <a:fld id="{3FF0AA88-B50B-4131-949A-1A319404F7FD}" type="slidenum">
               <a:rPr b="0" lang="en-US" sz="1200" spc="-1" strike="noStrike">
                 <a:solidFill>
                   <a:srgbClr val="888888"/>
@@ -5910,6 +6040,16 @@
                 <a:spcPts val="499"/>
               </a:spcBef>
             </a:pPr>
+            <a:r>
+              <a:rPr b="0" lang="en-US" sz="2400" spc="-1" strike="noStrike">
+                <a:solidFill>
+                  <a:srgbClr val="000000"/>
+                </a:solidFill>
+                <a:latin typeface="Calibri"/>
+                <a:ea typeface="Calibri"/>
+              </a:rPr>
+              <a:t>Looking forward to the next</a:t>
+            </a:r>
             <a:endParaRPr b="0" lang="en-US" sz="2400" spc="-1" strike="noStrike">
               <a:latin typeface="Arial"/>
             </a:endParaRPr>
@@ -5931,7 +6071,7 @@
                 <a:latin typeface="Calibri"/>
                 <a:ea typeface="Calibri"/>
               </a:rPr>
-              <a:t>Looking forward to the next</a:t>
+              <a:t>IETF hackathon !</a:t>
             </a:r>
             <a:endParaRPr b="0" lang="en-US" sz="2400" spc="-1" strike="noStrike">
               <a:latin typeface="Arial"/>
@@ -5954,7 +6094,76 @@
                 <a:latin typeface="Calibri"/>
                 <a:ea typeface="Calibri"/>
               </a:rPr>
-              <a:t>IETF hackathon !</a:t>
+              <a:t>Thanks:</a:t>
+            </a:r>
+            <a:endParaRPr b="0" lang="en-US" sz="2400" spc="-1" strike="noStrike">
+              <a:latin typeface="Arial"/>
+            </a:endParaRPr>
+          </a:p>
+          <a:p>
+            <a:pPr>
+              <a:lnSpc>
+                <a:spcPct val="90000"/>
+              </a:lnSpc>
+              <a:spcBef>
+                <a:spcPts val="499"/>
+              </a:spcBef>
+            </a:pPr>
+            <a:r>
+              <a:rPr b="0" lang="en-US" sz="2400" spc="-1" strike="noStrike">
+                <a:solidFill>
+                  <a:srgbClr val="000000"/>
+                </a:solidFill>
+                <a:latin typeface="Calibri"/>
+                <a:ea typeface="Calibri"/>
+              </a:rPr>
+              <a:t>Charles Eckel</a:t>
+            </a:r>
+            <a:endParaRPr b="0" lang="en-US" sz="2400" spc="-1" strike="noStrike">
+              <a:latin typeface="Arial"/>
+            </a:endParaRPr>
+          </a:p>
+          <a:p>
+            <a:pPr>
+              <a:lnSpc>
+                <a:spcPct val="90000"/>
+              </a:lnSpc>
+              <a:spcBef>
+                <a:spcPts val="499"/>
+              </a:spcBef>
+            </a:pPr>
+            <a:r>
+              <a:rPr b="0" lang="en-US" sz="2400" spc="-1" strike="noStrike">
+                <a:solidFill>
+                  <a:srgbClr val="000000"/>
+                </a:solidFill>
+                <a:latin typeface="Calibri"/>
+                <a:ea typeface="Calibri"/>
+              </a:rPr>
+              <a:t>Meetecho team</a:t>
+            </a:r>
+            <a:endParaRPr b="0" lang="en-US" sz="2400" spc="-1" strike="noStrike">
+              <a:latin typeface="Arial"/>
+            </a:endParaRPr>
+          </a:p>
+          <a:p>
+            <a:pPr>
+              <a:lnSpc>
+                <a:spcPct val="90000"/>
+              </a:lnSpc>
+              <a:spcBef>
+                <a:spcPts val="499"/>
+              </a:spcBef>
+            </a:pPr>
+            <a:r>
+              <a:rPr b="0" lang="en-US" sz="2400" spc="-1" strike="noStrike">
+                <a:solidFill>
+                  <a:srgbClr val="000000"/>
+                </a:solidFill>
+                <a:latin typeface="Calibri"/>
+                <a:ea typeface="Calibri"/>
+              </a:rPr>
+              <a:t>Other members of cyberstorm.mu.</a:t>
             </a:r>
             <a:endParaRPr b="0" lang="en-US" sz="2400" spc="-1" strike="noStrike">
               <a:latin typeface="Arial"/>

</xml_diff>